<commit_message>
Deployed 81f16f6 with MkDocs version: 0.17.5
</commit_message>
<xml_diff>
--- a/materials/day2/files/osgus19-day2-part2-security.pptx
+++ b/materials/day2/files/osgus19-day2-part2-security.pptx
@@ -790,7 +790,7 @@
   <p:cSld>
     <p:spTree>
       <p:nvGrpSpPr>
-        <p:cNvPr id="192" name="Shape 192"/>
+        <p:cNvPr id="191" name="Shape 191"/>
         <p:cNvGrpSpPr/>
         <p:nvPr/>
       </p:nvGrpSpPr>
@@ -804,7 +804,7 @@
       </p:grpSpPr>
       <p:sp>
         <p:nvSpPr>
-          <p:cNvPr id="193" name="Google Shape;193;g5d3490d8d4_0_9:notes"/>
+          <p:cNvPr id="192" name="Google Shape;192;g5d3490d8d4_0_9:notes"/>
           <p:cNvSpPr/>
           <p:nvPr>
             <p:ph idx="2" type="sldImg"/>
@@ -839,7 +839,7 @@
       </p:sp>
       <p:sp>
         <p:nvSpPr>
-          <p:cNvPr id="194" name="Google Shape;194;g5d3490d8d4_0_9:notes"/>
+          <p:cNvPr id="193" name="Google Shape;193;g5d3490d8d4_0_9:notes"/>
           <p:cNvSpPr txBox="1"/>
           <p:nvPr>
             <p:ph idx="1" type="body"/>
@@ -893,7 +893,7 @@
   <p:cSld>
     <p:spTree>
       <p:nvGrpSpPr>
-        <p:cNvPr id="129" name="Shape 129"/>
+        <p:cNvPr id="128" name="Shape 128"/>
         <p:cNvGrpSpPr/>
         <p:nvPr/>
       </p:nvGrpSpPr>
@@ -907,7 +907,7 @@
       </p:grpSpPr>
       <p:sp>
         <p:nvSpPr>
-          <p:cNvPr id="130" name="Google Shape;130;ga458b8f80_0_36:notes"/>
+          <p:cNvPr id="129" name="Google Shape;129;ga458b8f80_0_36:notes"/>
           <p:cNvSpPr/>
           <p:nvPr>
             <p:ph idx="2" type="sldImg"/>
@@ -942,7 +942,7 @@
       </p:sp>
       <p:sp>
         <p:nvSpPr>
-          <p:cNvPr id="131" name="Google Shape;131;ga458b8f80_0_36:notes"/>
+          <p:cNvPr id="130" name="Google Shape;130;ga458b8f80_0_36:notes"/>
           <p:cNvSpPr txBox="1"/>
           <p:nvPr>
             <p:ph idx="1" type="body"/>
@@ -992,7 +992,7 @@
   <p:cSld>
     <p:spTree>
       <p:nvGrpSpPr>
-        <p:cNvPr id="138" name="Shape 138"/>
+        <p:cNvPr id="137" name="Shape 137"/>
         <p:cNvGrpSpPr/>
         <p:nvPr/>
       </p:nvGrpSpPr>
@@ -1006,7 +1006,7 @@
       </p:grpSpPr>
       <p:sp>
         <p:nvSpPr>
-          <p:cNvPr id="139" name="Google Shape;139;g15f48c30b0_0_90:notes"/>
+          <p:cNvPr id="138" name="Google Shape;138;g15f48c30b0_0_90:notes"/>
           <p:cNvSpPr/>
           <p:nvPr>
             <p:ph idx="2" type="sldImg"/>
@@ -1041,7 +1041,7 @@
       </p:sp>
       <p:sp>
         <p:nvSpPr>
-          <p:cNvPr id="140" name="Google Shape;140;g15f48c30b0_0_90:notes"/>
+          <p:cNvPr id="139" name="Google Shape;139;g15f48c30b0_0_90:notes"/>
           <p:cNvSpPr txBox="1"/>
           <p:nvPr>
             <p:ph idx="1" type="body"/>
@@ -1091,7 +1091,7 @@
   <p:cSld>
     <p:spTree>
       <p:nvGrpSpPr>
-        <p:cNvPr id="144" name="Shape 144"/>
+        <p:cNvPr id="143" name="Shape 143"/>
         <p:cNvGrpSpPr/>
         <p:nvPr/>
       </p:nvGrpSpPr>
@@ -1105,7 +1105,7 @@
       </p:grpSpPr>
       <p:sp>
         <p:nvSpPr>
-          <p:cNvPr id="145" name="Google Shape;145;ga458b8f80_1_74:notes"/>
+          <p:cNvPr id="144" name="Google Shape;144;ga458b8f80_1_74:notes"/>
           <p:cNvSpPr/>
           <p:nvPr>
             <p:ph idx="2" type="sldImg"/>
@@ -1140,7 +1140,7 @@
       </p:sp>
       <p:sp>
         <p:nvSpPr>
-          <p:cNvPr id="146" name="Google Shape;146;ga458b8f80_1_74:notes"/>
+          <p:cNvPr id="145" name="Google Shape;145;ga458b8f80_1_74:notes"/>
           <p:cNvSpPr txBox="1"/>
           <p:nvPr>
             <p:ph idx="1" type="body"/>
@@ -1190,7 +1190,7 @@
   <p:cSld>
     <p:spTree>
       <p:nvGrpSpPr>
-        <p:cNvPr id="153" name="Shape 153"/>
+        <p:cNvPr id="152" name="Shape 152"/>
         <p:cNvGrpSpPr/>
         <p:nvPr/>
       </p:nvGrpSpPr>
@@ -1204,7 +1204,7 @@
       </p:grpSpPr>
       <p:sp>
         <p:nvSpPr>
-          <p:cNvPr id="154" name="Google Shape;154;ga458b8f80_1_19:notes"/>
+          <p:cNvPr id="153" name="Google Shape;153;ga458b8f80_1_19:notes"/>
           <p:cNvSpPr/>
           <p:nvPr>
             <p:ph idx="2" type="sldImg"/>
@@ -1239,7 +1239,7 @@
       </p:sp>
       <p:sp>
         <p:nvSpPr>
-          <p:cNvPr id="155" name="Google Shape;155;ga458b8f80_1_19:notes"/>
+          <p:cNvPr id="154" name="Google Shape;154;ga458b8f80_1_19:notes"/>
           <p:cNvSpPr txBox="1"/>
           <p:nvPr>
             <p:ph idx="1" type="body"/>
@@ -1289,7 +1289,7 @@
   <p:cSld>
     <p:spTree>
       <p:nvGrpSpPr>
-        <p:cNvPr id="162" name="Shape 162"/>
+        <p:cNvPr id="161" name="Shape 161"/>
         <p:cNvGrpSpPr/>
         <p:nvPr/>
       </p:nvGrpSpPr>
@@ -1303,7 +1303,7 @@
       </p:grpSpPr>
       <p:sp>
         <p:nvSpPr>
-          <p:cNvPr id="163" name="Google Shape;163;ga458b8f80_1_49:notes"/>
+          <p:cNvPr id="162" name="Google Shape;162;ga458b8f80_1_49:notes"/>
           <p:cNvSpPr/>
           <p:nvPr>
             <p:ph idx="2" type="sldImg"/>
@@ -1338,7 +1338,7 @@
       </p:sp>
       <p:sp>
         <p:nvSpPr>
-          <p:cNvPr id="164" name="Google Shape;164;ga458b8f80_1_49:notes"/>
+          <p:cNvPr id="163" name="Google Shape;163;ga458b8f80_1_49:notes"/>
           <p:cNvSpPr txBox="1"/>
           <p:nvPr>
             <p:ph idx="1" type="body"/>
@@ -1388,7 +1388,7 @@
   <p:cSld>
     <p:spTree>
       <p:nvGrpSpPr>
-        <p:cNvPr id="169" name="Shape 169"/>
+        <p:cNvPr id="168" name="Shape 168"/>
         <p:cNvGrpSpPr/>
         <p:nvPr/>
       </p:nvGrpSpPr>
@@ -1402,7 +1402,7 @@
       </p:grpSpPr>
       <p:sp>
         <p:nvSpPr>
-          <p:cNvPr id="170" name="Google Shape;170;g5c2c4bad2_0_7:notes"/>
+          <p:cNvPr id="169" name="Google Shape;169;g5c2c4bad2_0_7:notes"/>
           <p:cNvSpPr/>
           <p:nvPr>
             <p:ph idx="2" type="sldImg"/>
@@ -1437,7 +1437,7 @@
       </p:sp>
       <p:sp>
         <p:nvSpPr>
-          <p:cNvPr id="171" name="Google Shape;171;g5c2c4bad2_0_7:notes"/>
+          <p:cNvPr id="170" name="Google Shape;170;g5c2c4bad2_0_7:notes"/>
           <p:cNvSpPr txBox="1"/>
           <p:nvPr>
             <p:ph idx="1" type="body"/>
@@ -1487,7 +1487,7 @@
   <p:cSld>
     <p:spTree>
       <p:nvGrpSpPr>
-        <p:cNvPr id="176" name="Shape 176"/>
+        <p:cNvPr id="175" name="Shape 175"/>
         <p:cNvGrpSpPr/>
         <p:nvPr/>
       </p:nvGrpSpPr>
@@ -1501,7 +1501,7 @@
       </p:grpSpPr>
       <p:sp>
         <p:nvSpPr>
-          <p:cNvPr id="177" name="Google Shape;177;ga458b8f80_1_55:notes"/>
+          <p:cNvPr id="176" name="Google Shape;176;ga458b8f80_1_55:notes"/>
           <p:cNvSpPr/>
           <p:nvPr>
             <p:ph idx="2" type="sldImg"/>
@@ -1536,7 +1536,7 @@
       </p:sp>
       <p:sp>
         <p:nvSpPr>
-          <p:cNvPr id="178" name="Google Shape;178;ga458b8f80_1_55:notes"/>
+          <p:cNvPr id="177" name="Google Shape;177;ga458b8f80_1_55:notes"/>
           <p:cNvSpPr txBox="1"/>
           <p:nvPr>
             <p:ph idx="1" type="body"/>
@@ -1586,7 +1586,7 @@
   <p:cSld>
     <p:spTree>
       <p:nvGrpSpPr>
-        <p:cNvPr id="185" name="Shape 185"/>
+        <p:cNvPr id="184" name="Shape 184"/>
         <p:cNvGrpSpPr/>
         <p:nvPr/>
       </p:nvGrpSpPr>
@@ -1600,7 +1600,7 @@
       </p:grpSpPr>
       <p:sp>
         <p:nvSpPr>
-          <p:cNvPr id="186" name="Google Shape;186;g5d3490d8d4_0_76:notes"/>
+          <p:cNvPr id="185" name="Google Shape;185;g5d3490d8d4_0_76:notes"/>
           <p:cNvSpPr/>
           <p:nvPr>
             <p:ph idx="2" type="sldImg"/>
@@ -1635,7 +1635,7 @@
       </p:sp>
       <p:sp>
         <p:nvSpPr>
-          <p:cNvPr id="187" name="Google Shape;187;g5d3490d8d4_0_76:notes"/>
+          <p:cNvPr id="186" name="Google Shape;186;g5d3490d8d4_0_76:notes"/>
           <p:cNvSpPr txBox="1"/>
           <p:nvPr>
             <p:ph idx="1" type="body"/>
@@ -21618,57 +21618,6 @@
           </a:p>
         </p:txBody>
       </p:sp>
-      <p:sp>
-        <p:nvSpPr>
-          <p:cNvPr id="128" name="Google Shape;128;p24"/>
-          <p:cNvSpPr txBox="1"/>
-          <p:nvPr>
-            <p:ph idx="1" type="subTitle"/>
-          </p:nvPr>
-        </p:nvSpPr>
-        <p:spPr>
-          <a:xfrm>
-            <a:off x="647700" y="2914650"/>
-            <a:ext cx="8127900" cy="1314300"/>
-          </a:xfrm>
-          <a:prstGeom prst="rect">
-            <a:avLst/>
-          </a:prstGeom>
-        </p:spPr>
-        <p:txBody>
-          <a:bodyPr anchorCtr="0" anchor="t" bIns="91425" lIns="91425" spcFirstLastPara="1" rIns="91425" wrap="square" tIns="91425">
-            <a:noAutofit/>
-          </a:bodyPr>
-          <a:lstStyle/>
-          <a:p>
-            <a:pPr indent="0" lvl="0" marL="0" rtl="0" algn="ctr">
-              <a:lnSpc>
-                <a:spcPct val="100000"/>
-              </a:lnSpc>
-              <a:spcBef>
-                <a:spcPts val="0"/>
-              </a:spcBef>
-              <a:spcAft>
-                <a:spcPts val="0"/>
-              </a:spcAft>
-              <a:buNone/>
-            </a:pPr>
-            <a:r>
-              <a:rPr lang="en">
-                <a:solidFill>
-                  <a:srgbClr val="000080"/>
-                </a:solidFill>
-              </a:rPr>
-              <a:t>Lil Nas X</a:t>
-            </a:r>
-            <a:endParaRPr>
-              <a:solidFill>
-                <a:srgbClr val="000080"/>
-              </a:solidFill>
-            </a:endParaRPr>
-          </a:p>
-        </p:txBody>
-      </p:sp>
     </p:spTree>
   </p:cSld>
   <p:clrMapOvr>
@@ -21682,7 +21631,7 @@
   <p:cSld>
     <p:spTree>
       <p:nvGrpSpPr>
-        <p:cNvPr id="195" name="Shape 195"/>
+        <p:cNvPr id="194" name="Shape 194"/>
         <p:cNvGrpSpPr/>
         <p:nvPr/>
       </p:nvGrpSpPr>
@@ -21696,7 +21645,7 @@
       </p:grpSpPr>
       <p:sp>
         <p:nvSpPr>
-          <p:cNvPr id="196" name="Google Shape;196;p33"/>
+          <p:cNvPr id="195" name="Google Shape;195;p33"/>
           <p:cNvSpPr txBox="1"/>
           <p:nvPr>
             <p:ph type="title"/>
@@ -21736,7 +21685,7 @@
       </p:sp>
       <p:sp>
         <p:nvSpPr>
-          <p:cNvPr id="197" name="Google Shape;197;p33"/>
+          <p:cNvPr id="196" name="Google Shape;196;p33"/>
           <p:cNvSpPr txBox="1"/>
           <p:nvPr>
             <p:ph idx="1" type="body"/>
@@ -21840,7 +21789,7 @@
       </p:sp>
       <p:sp>
         <p:nvSpPr>
-          <p:cNvPr id="198" name="Google Shape;198;p33"/>
+          <p:cNvPr id="197" name="Google Shape;197;p33"/>
           <p:cNvSpPr txBox="1"/>
           <p:nvPr>
             <p:ph idx="12" type="sldNum"/>
@@ -21891,7 +21840,7 @@
   <p:cSld>
     <p:spTree>
       <p:nvGrpSpPr>
-        <p:cNvPr id="132" name="Shape 132"/>
+        <p:cNvPr id="131" name="Shape 131"/>
         <p:cNvGrpSpPr/>
         <p:nvPr/>
       </p:nvGrpSpPr>
@@ -21905,7 +21854,7 @@
       </p:grpSpPr>
       <p:sp>
         <p:nvSpPr>
-          <p:cNvPr id="133" name="Google Shape;133;p25"/>
+          <p:cNvPr id="132" name="Google Shape;132;p25"/>
           <p:cNvSpPr txBox="1"/>
           <p:nvPr>
             <p:ph type="title"/>
@@ -21945,7 +21894,7 @@
       </p:sp>
       <p:sp>
         <p:nvSpPr>
-          <p:cNvPr id="134" name="Google Shape;134;p25"/>
+          <p:cNvPr id="133" name="Google Shape;133;p25"/>
           <p:cNvSpPr txBox="1"/>
           <p:nvPr>
             <p:ph idx="12" type="sldNum"/>
@@ -21989,7 +21938,7 @@
       </p:sp>
       <p:sp>
         <p:nvSpPr>
-          <p:cNvPr id="135" name="Google Shape;135;p25"/>
+          <p:cNvPr id="134" name="Google Shape;134;p25"/>
           <p:cNvSpPr/>
           <p:nvPr/>
         </p:nvSpPr>
@@ -22036,7 +21985,7 @@
       </p:sp>
       <p:pic>
         <p:nvPicPr>
-          <p:cNvPr id="136" name="Google Shape;136;p25"/>
+          <p:cNvPr id="135" name="Google Shape;135;p25"/>
           <p:cNvPicPr preferRelativeResize="0"/>
           <p:nvPr/>
         </p:nvPicPr>
@@ -22063,7 +22012,7 @@
       </p:pic>
       <p:sp>
         <p:nvSpPr>
-          <p:cNvPr id="137" name="Google Shape;137;p25"/>
+          <p:cNvPr id="136" name="Google Shape;136;p25"/>
           <p:cNvSpPr txBox="1"/>
           <p:nvPr/>
         </p:nvSpPr>
@@ -22133,7 +22082,7 @@
   <p:cSld>
     <p:spTree>
       <p:nvGrpSpPr>
-        <p:cNvPr id="141" name="Shape 141"/>
+        <p:cNvPr id="140" name="Shape 140"/>
         <p:cNvGrpSpPr/>
         <p:nvPr/>
       </p:nvGrpSpPr>
@@ -22147,7 +22096,7 @@
       </p:grpSpPr>
       <p:sp>
         <p:nvSpPr>
-          <p:cNvPr id="142" name="Google Shape;142;p26"/>
+          <p:cNvPr id="141" name="Google Shape;141;p26"/>
           <p:cNvSpPr txBox="1"/>
           <p:nvPr>
             <p:ph type="ctrTitle"/>
@@ -22187,7 +22136,7 @@
       </p:sp>
       <p:sp>
         <p:nvSpPr>
-          <p:cNvPr id="143" name="Google Shape;143;p26"/>
+          <p:cNvPr id="142" name="Google Shape;142;p26"/>
           <p:cNvSpPr txBox="1"/>
           <p:nvPr>
             <p:ph idx="1" type="subTitle"/>
@@ -22303,7 +22252,7 @@
   <p:cSld>
     <p:spTree>
       <p:nvGrpSpPr>
-        <p:cNvPr id="147" name="Shape 147"/>
+        <p:cNvPr id="146" name="Shape 146"/>
         <p:cNvGrpSpPr/>
         <p:nvPr/>
       </p:nvGrpSpPr>
@@ -22317,7 +22266,7 @@
       </p:grpSpPr>
       <p:sp>
         <p:nvSpPr>
-          <p:cNvPr id="148" name="Google Shape;148;p27"/>
+          <p:cNvPr id="147" name="Google Shape;147;p27"/>
           <p:cNvSpPr txBox="1"/>
           <p:nvPr>
             <p:ph type="title"/>
@@ -22357,7 +22306,7 @@
       </p:sp>
       <p:sp>
         <p:nvSpPr>
-          <p:cNvPr id="149" name="Google Shape;149;p27"/>
+          <p:cNvPr id="148" name="Google Shape;148;p27"/>
           <p:cNvSpPr txBox="1"/>
           <p:nvPr>
             <p:ph idx="1" type="body"/>
@@ -22533,7 +22482,7 @@
       </p:sp>
       <p:sp>
         <p:nvSpPr>
-          <p:cNvPr id="150" name="Google Shape;150;p27"/>
+          <p:cNvPr id="149" name="Google Shape;149;p27"/>
           <p:cNvSpPr txBox="1"/>
           <p:nvPr>
             <p:ph idx="12" type="sldNum"/>
@@ -22577,7 +22526,7 @@
       </p:sp>
       <p:sp>
         <p:nvSpPr>
-          <p:cNvPr id="151" name="Google Shape;151;p27"/>
+          <p:cNvPr id="150" name="Google Shape;150;p27"/>
           <p:cNvSpPr txBox="1"/>
           <p:nvPr/>
         </p:nvSpPr>
@@ -22637,7 +22586,7 @@
       </p:sp>
       <p:pic>
         <p:nvPicPr>
-          <p:cNvPr id="152" name="Google Shape;152;p27"/>
+          <p:cNvPr id="151" name="Google Shape;151;p27"/>
           <p:cNvPicPr preferRelativeResize="0"/>
           <p:nvPr/>
         </p:nvPicPr>
@@ -22675,7 +22624,7 @@
   <p:cSld>
     <p:spTree>
       <p:nvGrpSpPr>
-        <p:cNvPr id="156" name="Shape 156"/>
+        <p:cNvPr id="155" name="Shape 155"/>
         <p:cNvGrpSpPr/>
         <p:nvPr/>
       </p:nvGrpSpPr>
@@ -22689,7 +22638,7 @@
       </p:grpSpPr>
       <p:sp>
         <p:nvSpPr>
-          <p:cNvPr id="157" name="Google Shape;157;p28"/>
+          <p:cNvPr id="156" name="Google Shape;156;p28"/>
           <p:cNvSpPr txBox="1"/>
           <p:nvPr>
             <p:ph type="title"/>
@@ -22729,7 +22678,7 @@
       </p:sp>
       <p:sp>
         <p:nvSpPr>
-          <p:cNvPr id="158" name="Google Shape;158;p28"/>
+          <p:cNvPr id="157" name="Google Shape;157;p28"/>
           <p:cNvSpPr txBox="1"/>
           <p:nvPr>
             <p:ph idx="1" type="body"/>
@@ -22843,7 +22792,7 @@
             </a:endParaRPr>
           </a:p>
           <a:p>
-            <a:pPr indent="-381000" lvl="0" marL="457200" rtl="0" algn="l">
+            <a:pPr indent="-381000" lvl="1" marL="914400" rtl="0" algn="l">
               <a:spcBef>
                 <a:spcPts val="0"/>
               </a:spcBef>
@@ -22851,7 +22800,7 @@
                 <a:spcPts val="0"/>
               </a:spcAft>
               <a:buSzPts val="2400"/>
-              <a:buChar char="•"/>
+              <a:buChar char="−"/>
             </a:pPr>
             <a:r>
               <a:rPr b="1" lang="en" sz="2400">
@@ -22859,7 +22808,7 @@
                   <a:srgbClr val="000080"/>
                 </a:solidFill>
               </a:rPr>
-              <a:t>Real word ID:</a:t>
+              <a:t>Real word:</a:t>
             </a:r>
             <a:r>
               <a:rPr lang="en" sz="2400">
@@ -22876,7 +22825,7 @@
             </a:endParaRPr>
           </a:p>
           <a:p>
-            <a:pPr indent="-381000" lvl="0" marL="457200" rtl="0" algn="l">
+            <a:pPr indent="-381000" lvl="1" marL="914400" rtl="0" algn="l">
               <a:spcBef>
                 <a:spcPts val="0"/>
               </a:spcBef>
@@ -22884,7 +22833,7 @@
                 <a:spcPts val="0"/>
               </a:spcAft>
               <a:buSzPts val="2400"/>
-              <a:buChar char="•"/>
+              <a:buChar char="−"/>
             </a:pPr>
             <a:r>
               <a:rPr b="1" lang="en" sz="2400">
@@ -22892,7 +22841,7 @@
                   <a:srgbClr val="000080"/>
                 </a:solidFill>
               </a:rPr>
-              <a:t>Internet ID:</a:t>
+              <a:t>Online:</a:t>
             </a:r>
             <a:r>
               <a:rPr lang="en" sz="2400">
@@ -22912,7 +22861,7 @@
       </p:sp>
       <p:sp>
         <p:nvSpPr>
-          <p:cNvPr id="159" name="Google Shape;159;p28"/>
+          <p:cNvPr id="158" name="Google Shape;158;p28"/>
           <p:cNvSpPr txBox="1"/>
           <p:nvPr>
             <p:ph idx="12" type="sldNum"/>
@@ -22956,7 +22905,7 @@
       </p:sp>
       <p:sp>
         <p:nvSpPr>
-          <p:cNvPr id="160" name="Google Shape;160;p28"/>
+          <p:cNvPr id="159" name="Google Shape;159;p28"/>
           <p:cNvSpPr txBox="1"/>
           <p:nvPr/>
         </p:nvSpPr>
@@ -23077,7 +23026,7 @@
       </p:sp>
       <p:pic>
         <p:nvPicPr>
-          <p:cNvPr id="161" name="Google Shape;161;p28"/>
+          <p:cNvPr id="160" name="Google Shape;160;p28"/>
           <p:cNvPicPr preferRelativeResize="0"/>
           <p:nvPr/>
         </p:nvPicPr>
@@ -23115,7 +23064,7 @@
   <p:cSld>
     <p:spTree>
       <p:nvGrpSpPr>
-        <p:cNvPr id="165" name="Shape 165"/>
+        <p:cNvPr id="164" name="Shape 164"/>
         <p:cNvGrpSpPr/>
         <p:nvPr/>
       </p:nvGrpSpPr>
@@ -23129,7 +23078,7 @@
       </p:grpSpPr>
       <p:sp>
         <p:nvSpPr>
-          <p:cNvPr id="166" name="Google Shape;166;p29"/>
+          <p:cNvPr id="165" name="Google Shape;165;p29"/>
           <p:cNvSpPr txBox="1"/>
           <p:nvPr>
             <p:ph type="title"/>
@@ -23169,7 +23118,7 @@
       </p:sp>
       <p:sp>
         <p:nvSpPr>
-          <p:cNvPr id="167" name="Google Shape;167;p29"/>
+          <p:cNvPr id="166" name="Google Shape;166;p29"/>
           <p:cNvSpPr txBox="1"/>
           <p:nvPr>
             <p:ph idx="1" type="body"/>
@@ -23309,7 +23258,7 @@
                   <a:srgbClr val="000080"/>
                 </a:solidFill>
               </a:rPr>
-              <a:t>Authorization: trusting identities</a:t>
+              <a:t>Authorization: levels of trust for identities</a:t>
             </a:r>
             <a:endParaRPr sz="2400">
               <a:solidFill>
@@ -23382,7 +23331,7 @@
       </p:sp>
       <p:sp>
         <p:nvSpPr>
-          <p:cNvPr id="168" name="Google Shape;168;p29"/>
+          <p:cNvPr id="167" name="Google Shape;167;p29"/>
           <p:cNvSpPr txBox="1"/>
           <p:nvPr>
             <p:ph idx="12" type="sldNum"/>
@@ -23437,7 +23386,7 @@
   <p:cSld>
     <p:spTree>
       <p:nvGrpSpPr>
-        <p:cNvPr id="172" name="Shape 172"/>
+        <p:cNvPr id="171" name="Shape 171"/>
         <p:cNvGrpSpPr/>
         <p:nvPr/>
       </p:nvGrpSpPr>
@@ -23451,7 +23400,7 @@
       </p:grpSpPr>
       <p:sp>
         <p:nvSpPr>
-          <p:cNvPr id="173" name="Google Shape;173;p30"/>
+          <p:cNvPr id="172" name="Google Shape;172;p30"/>
           <p:cNvSpPr txBox="1"/>
           <p:nvPr>
             <p:ph type="title"/>
@@ -23491,7 +23440,7 @@
       </p:sp>
       <p:sp>
         <p:nvSpPr>
-          <p:cNvPr id="174" name="Google Shape;174;p30"/>
+          <p:cNvPr id="173" name="Google Shape;173;p30"/>
           <p:cNvSpPr txBox="1"/>
           <p:nvPr>
             <p:ph idx="1" type="body"/>
@@ -23528,7 +23477,7 @@
                   <a:srgbClr val="000080"/>
                 </a:solidFill>
               </a:rPr>
-              <a:t>Certificate-based security for pilots jobs and servers</a:t>
+              <a:t>Resources and pilots verify each other’s identities</a:t>
             </a:r>
             <a:endParaRPr sz="2400">
               <a:solidFill>
@@ -23556,7 +23505,35 @@
                   <a:srgbClr val="000080"/>
                 </a:solidFill>
               </a:rPr>
-              <a:t>Jobs run under the same Unix user due to the pilot job model; Singularity containers can provide some separation between VO users</a:t>
+              <a:t>Jobs in the same VO all run under the same user!</a:t>
+            </a:r>
+            <a:endParaRPr sz="2400">
+              <a:solidFill>
+                <a:srgbClr val="000080"/>
+              </a:solidFill>
+            </a:endParaRPr>
+          </a:p>
+          <a:p>
+            <a:pPr indent="-381000" lvl="0" marL="457200" rtl="0" algn="l">
+              <a:spcBef>
+                <a:spcPts val="0"/>
+              </a:spcBef>
+              <a:spcAft>
+                <a:spcPts val="0"/>
+              </a:spcAft>
+              <a:buClr>
+                <a:srgbClr val="000080"/>
+              </a:buClr>
+              <a:buSzPts val="2400"/>
+              <a:buChar char="•"/>
+            </a:pPr>
+            <a:r>
+              <a:rPr lang="en" sz="2400">
+                <a:solidFill>
+                  <a:srgbClr val="000080"/>
+                </a:solidFill>
+              </a:rPr>
+              <a:t>Containers can provide some separation between VO users (for sites that support it)</a:t>
             </a:r>
             <a:endParaRPr sz="2400">
               <a:solidFill>
@@ -23621,7 +23598,7 @@
       </p:sp>
       <p:sp>
         <p:nvSpPr>
-          <p:cNvPr id="175" name="Google Shape;175;p30"/>
+          <p:cNvPr id="174" name="Google Shape;174;p30"/>
           <p:cNvSpPr txBox="1"/>
           <p:nvPr>
             <p:ph idx="12" type="sldNum"/>
@@ -23676,7 +23653,7 @@
   <p:cSld>
     <p:spTree>
       <p:nvGrpSpPr>
-        <p:cNvPr id="179" name="Shape 179"/>
+        <p:cNvPr id="178" name="Shape 178"/>
         <p:cNvGrpSpPr/>
         <p:nvPr/>
       </p:nvGrpSpPr>
@@ -23690,7 +23667,7 @@
       </p:grpSpPr>
       <p:sp>
         <p:nvSpPr>
-          <p:cNvPr id="180" name="Google Shape;180;p31"/>
+          <p:cNvPr id="179" name="Google Shape;179;p31"/>
           <p:cNvSpPr txBox="1"/>
           <p:nvPr>
             <p:ph type="title"/>
@@ -23730,7 +23707,7 @@
       </p:sp>
       <p:sp>
         <p:nvSpPr>
-          <p:cNvPr id="181" name="Google Shape;181;p31"/>
+          <p:cNvPr id="180" name="Google Shape;180;p31"/>
           <p:cNvSpPr txBox="1"/>
           <p:nvPr>
             <p:ph idx="1" type="body"/>
@@ -23831,6 +23808,34 @@
             </a:endParaRPr>
           </a:p>
           <a:p>
+            <a:pPr indent="-368300" lvl="0" marL="457200" rtl="0" algn="l">
+              <a:spcBef>
+                <a:spcPts val="0"/>
+              </a:spcBef>
+              <a:spcAft>
+                <a:spcPts val="0"/>
+              </a:spcAft>
+              <a:buClr>
+                <a:srgbClr val="000080"/>
+              </a:buClr>
+              <a:buSzPts val="2200"/>
+              <a:buChar char="•"/>
+            </a:pPr>
+            <a:r>
+              <a:rPr lang="en" sz="2200">
+                <a:solidFill>
+                  <a:srgbClr val="000080"/>
+                </a:solidFill>
+              </a:rPr>
+              <a:t>No data or code that CANNOT be copied</a:t>
+            </a:r>
+            <a:endParaRPr sz="2200">
+              <a:solidFill>
+                <a:srgbClr val="000080"/>
+              </a:solidFill>
+            </a:endParaRPr>
+          </a:p>
+          <a:p>
             <a:pPr indent="-139700" lvl="0" marL="342900" rtl="0" algn="l">
               <a:spcBef>
                 <a:spcPts val="640"/>
@@ -23853,7 +23858,7 @@
       </p:sp>
       <p:sp>
         <p:nvSpPr>
-          <p:cNvPr id="182" name="Google Shape;182;p31"/>
+          <p:cNvPr id="181" name="Google Shape;181;p31"/>
           <p:cNvSpPr txBox="1"/>
           <p:nvPr>
             <p:ph idx="12" type="sldNum"/>
@@ -23897,7 +23902,7 @@
       </p:sp>
       <p:pic>
         <p:nvPicPr>
-          <p:cNvPr id="183" name="Google Shape;183;p31"/>
+          <p:cNvPr id="182" name="Google Shape;182;p31"/>
           <p:cNvPicPr preferRelativeResize="0"/>
           <p:nvPr/>
         </p:nvPicPr>
@@ -23924,7 +23929,7 @@
       </p:pic>
       <p:sp>
         <p:nvSpPr>
-          <p:cNvPr id="184" name="Google Shape;184;p31"/>
+          <p:cNvPr id="183" name="Google Shape;183;p31"/>
           <p:cNvSpPr txBox="1"/>
           <p:nvPr/>
         </p:nvSpPr>
@@ -24060,7 +24065,7 @@
   <p:cSld>
     <p:spTree>
       <p:nvGrpSpPr>
-        <p:cNvPr id="188" name="Shape 188"/>
+        <p:cNvPr id="187" name="Shape 187"/>
         <p:cNvGrpSpPr/>
         <p:nvPr/>
       </p:nvGrpSpPr>
@@ -24074,7 +24079,7 @@
       </p:grpSpPr>
       <p:sp>
         <p:nvSpPr>
-          <p:cNvPr id="189" name="Google Shape;189;p32"/>
+          <p:cNvPr id="188" name="Google Shape;188;p32"/>
           <p:cNvSpPr txBox="1"/>
           <p:nvPr>
             <p:ph type="title"/>
@@ -24114,7 +24119,7 @@
       </p:sp>
       <p:sp>
         <p:nvSpPr>
-          <p:cNvPr id="190" name="Google Shape;190;p32"/>
+          <p:cNvPr id="189" name="Google Shape;189;p32"/>
           <p:cNvSpPr txBox="1"/>
           <p:nvPr>
             <p:ph idx="1" type="body"/>
@@ -24362,7 +24367,7 @@
       </p:sp>
       <p:sp>
         <p:nvSpPr>
-          <p:cNvPr id="191" name="Google Shape;191;p32"/>
+          <p:cNvPr id="190" name="Google Shape;190;p32"/>
           <p:cNvSpPr txBox="1"/>
           <p:nvPr>
             <p:ph idx="12" type="sldNum"/>

</xml_diff>

<commit_message>
Deployed a731e7e with MkDocs version: 0.17.5
</commit_message>
<xml_diff>
--- a/materials/day2/files/osgus19-day2-part2-security.pptx
+++ b/materials/day2/files/osgus19-day2-part2-security.pptx
@@ -22808,7 +22808,7 @@
                   <a:srgbClr val="000080"/>
                 </a:solidFill>
               </a:rPr>
-              <a:t>Real word:</a:t>
+              <a:t>Real world:</a:t>
             </a:r>
             <a:r>
               <a:rPr lang="en" sz="2400">
@@ -23799,7 +23799,7 @@
                   <a:srgbClr val="000080"/>
                 </a:solidFill>
               </a:rPr>
-              <a:t>No word-writable files</a:t>
+              <a:t>No world-writable files</a:t>
             </a:r>
             <a:endParaRPr sz="2200">
               <a:solidFill>

</xml_diff>